<commit_message>
백업 완료: 2023-11-26 03:21:53
Affected files:
노코드 엔지니어링/프레이머로 블로그 만들기.md
노코드 엔지니어링/프레이머로 블로그 만들기.pptx
</commit_message>
<xml_diff>
--- a/노코드 엔지니어링/프레이머로 블로그 만들기.pptx
+++ b/노코드 엔지니어링/프레이머로 블로그 만들기.pptx
@@ -13,6 +13,9 @@
     <p:sldId id="261" r:id="rId7"/>
     <p:sldId id="262" r:id="rId8"/>
     <p:sldId id="263" r:id="rId9"/>
+    <p:sldId id="264" r:id="rId10"/>
+    <p:sldId id="265" r:id="rId11"/>
+    <p:sldId id="266" r:id="rId12"/>
   </p:sldIdLst>
   <p:sldSz cx="12192000" cy="6858000"/>
   <p:notesSz cx="6858000" cy="9144000"/>
@@ -4015,6 +4018,793 @@
 </p:sld>
 </file>
 
+<file path=ppt/slides/slide10.xml><?xml version="1.0" encoding="utf-8"?>
+<p:sld xmlns:a="http://schemas.openxmlformats.org/drawingml/2006/main" xmlns:r="http://schemas.openxmlformats.org/officeDocument/2006/relationships" xmlns:p="http://schemas.openxmlformats.org/presentationml/2006/main">
+  <p:cSld>
+    <p:spTree>
+      <p:nvGrpSpPr>
+        <p:cNvPr id="1" name=""/>
+        <p:cNvGrpSpPr/>
+        <p:nvPr/>
+      </p:nvGrpSpPr>
+      <p:grpSpPr>
+        <a:xfrm>
+          <a:off x="0" y="0"/>
+          <a:ext cx="0" cy="0"/>
+          <a:chOff x="0" y="0"/>
+          <a:chExt cx="0" cy="0"/>
+        </a:xfrm>
+      </p:grpSpPr>
+      <p:sp>
+        <p:nvSpPr>
+          <p:cNvPr id="2" name="Title 1"/>
+          <p:cNvSpPr>
+            <a:spLocks noGrp="1"/>
+          </p:cNvSpPr>
+          <p:nvPr>
+            <p:ph type="title"/>
+          </p:nvPr>
+        </p:nvSpPr>
+        <p:spPr/>
+        <p:txBody>
+          <a:bodyPr/>
+          <a:lstStyle/>
+          <a:p>
+            <a:pPr lvl="0" indent="0" marL="0">
+              <a:buNone/>
+            </a:pPr>
+            <a:r>
+              <a:rPr/>
+              <a:t>에디터</a:t>
+            </a:r>
+          </a:p>
+        </p:txBody>
+      </p:sp>
+      <p:sp>
+        <p:nvSpPr>
+          <p:cNvPr id="3" name="Content Placeholder 2"/>
+          <p:cNvSpPr>
+            <a:spLocks noGrp="1"/>
+          </p:cNvSpPr>
+          <p:nvPr>
+            <p:ph idx="1"/>
+          </p:nvPr>
+        </p:nvSpPr>
+        <p:spPr/>
+        <p:txBody>
+          <a:bodyPr/>
+          <a:lstStyle/>
+          <a:p>
+            <a:pPr lvl="0" indent="0" marL="0">
+              <a:spcBef>
+                <a:spcPts val="3000"/>
+              </a:spcBef>
+              <a:buNone/>
+            </a:pPr>
+            <a:r>
+              <a:rPr b="1"/>
+              <a:t>캔버스</a:t>
+            </a:r>
+          </a:p>
+          <a:p>
+            <a:pPr lvl="0"/>
+            <a:r>
+              <a:rPr/>
+              <a:t>가로/세로로 거의 무한하게 늘어남</a:t>
+            </a:r>
+          </a:p>
+          <a:p>
+            <a:pPr lvl="0"/>
+            <a:r>
+              <a:rPr/>
+              <a:t>1 페이지 = 1 캔버스</a:t>
+            </a:r>
+          </a:p>
+          <a:p>
+            <a:pPr lvl="0" indent="0" marL="0">
+              <a:spcBef>
+                <a:spcPts val="3000"/>
+              </a:spcBef>
+              <a:buNone/>
+            </a:pPr>
+            <a:r>
+              <a:rPr b="1"/>
+              <a:t>페이지(Pages)</a:t>
+            </a:r>
+          </a:p>
+          <a:p>
+            <a:pPr lvl="0"/>
+            <a:r>
+              <a:rPr/>
+              <a:t>말 그대로 페이지</a:t>
+            </a:r>
+          </a:p>
+          <a:p>
+            <a:pPr lvl="0"/>
+            <a:r>
+              <a:rPr/>
+              <a:t>웹 / CMS / 캔버스</a:t>
+            </a:r>
+          </a:p>
+          <a:p>
+            <a:pPr lvl="1"/>
+            <a:r>
+              <a:rPr/>
+              <a:t>웹: Publish 했을 때 인터넷에 배포되어서 주소로 접근할 수 있는 페이지</a:t>
+            </a:r>
+          </a:p>
+          <a:p>
+            <a:pPr lvl="1"/>
+            <a:r>
+              <a:rPr/>
+              <a:t>CMS: CMS 컬렉션으로 자동 구성되는 웹 페이지</a:t>
+            </a:r>
+          </a:p>
+          <a:p>
+            <a:pPr lvl="1"/>
+            <a:r>
+              <a:rPr/>
+              <a:t>캔버스: 프로토타이핑을 위한 페이지, React.js 컴포넌트를 Hand off로 개발자에게 전달 가능</a:t>
+            </a:r>
+          </a:p>
+        </p:txBody>
+      </p:sp>
+    </p:spTree>
+  </p:cSld>
+  <p:timing>
+    <p:tnLst>
+      <p:par>
+        <p:cTn id="1" dur="indefinite" restart="never" nodeType="tmRoot">
+          <p:childTnLst>
+            <p:seq concurrent="1" nextAc="seek">
+              <p:cTn id="2" dur="indefinite" nodeType="mainSeq">
+                <p:childTnLst>
+                  <p:par>
+                    <p:cTn id="3" fill="hold">
+                      <p:stCondLst>
+                        <p:cond delay="indefinite"/>
+                      </p:stCondLst>
+                      <p:childTnLst>
+                        <p:par>
+                          <p:cTn id="4" fill="hold">
+                            <p:stCondLst>
+                              <p:cond delay="0"/>
+                            </p:stCondLst>
+                            <p:childTnLst>
+                              <p:par>
+                                <p:cTn id="5" presetID="1" presetClass="entr" presetSubtype="0" fill="hold" grpId="0" nodeType="clickEffect">
+                                  <p:stCondLst>
+                                    <p:cond delay="0"/>
+                                  </p:stCondLst>
+                                  <p:childTnLst>
+                                    <p:set>
+                                      <p:cBhvr>
+                                        <p:cTn id="6" dur="1" fill="hold">
+                                          <p:stCondLst>
+                                            <p:cond delay="0"/>
+                                          </p:stCondLst>
+                                        </p:cTn>
+                                        <p:tgtEl>
+                                          <p:spTgt spid="3">
+                                            <p:txEl>
+                                              <p:pRg st="1" end="1"/>
+                                            </p:txEl>
+                                          </p:spTgt>
+                                        </p:tgtEl>
+                                        <p:attrNameLst>
+                                          <p:attrName>style.visibility</p:attrName>
+                                        </p:attrNameLst>
+                                      </p:cBhvr>
+                                      <p:to>
+                                        <p:strVal val="visible"/>
+                                      </p:to>
+                                    </p:set>
+                                  </p:childTnLst>
+                                </p:cTn>
+                              </p:par>
+                            </p:childTnLst>
+                          </p:cTn>
+                        </p:par>
+                      </p:childTnLst>
+                    </p:cTn>
+                  </p:par>
+                  <p:par>
+                    <p:cTn id="7" fill="hold">
+                      <p:stCondLst>
+                        <p:cond delay="indefinite"/>
+                      </p:stCondLst>
+                      <p:childTnLst>
+                        <p:par>
+                          <p:cTn id="8" fill="hold">
+                            <p:stCondLst>
+                              <p:cond delay="0"/>
+                            </p:stCondLst>
+                            <p:childTnLst>
+                              <p:par>
+                                <p:cTn id="9" presetID="1" presetClass="entr" presetSubtype="0" fill="hold" grpId="0" nodeType="clickEffect">
+                                  <p:stCondLst>
+                                    <p:cond delay="0"/>
+                                  </p:stCondLst>
+                                  <p:childTnLst>
+                                    <p:set>
+                                      <p:cBhvr>
+                                        <p:cTn id="10" dur="1" fill="hold">
+                                          <p:stCondLst>
+                                            <p:cond delay="0"/>
+                                          </p:stCondLst>
+                                        </p:cTn>
+                                        <p:tgtEl>
+                                          <p:spTgt spid="3">
+                                            <p:txEl>
+                                              <p:pRg st="2" end="2"/>
+                                            </p:txEl>
+                                          </p:spTgt>
+                                        </p:tgtEl>
+                                        <p:attrNameLst>
+                                          <p:attrName>style.visibility</p:attrName>
+                                        </p:attrNameLst>
+                                      </p:cBhvr>
+                                      <p:to>
+                                        <p:strVal val="visible"/>
+                                      </p:to>
+                                    </p:set>
+                                  </p:childTnLst>
+                                </p:cTn>
+                              </p:par>
+                            </p:childTnLst>
+                          </p:cTn>
+                        </p:par>
+                      </p:childTnLst>
+                    </p:cTn>
+                  </p:par>
+                  <p:par>
+                    <p:cTn id="11" fill="hold">
+                      <p:stCondLst>
+                        <p:cond delay="indefinite"/>
+                      </p:stCondLst>
+                      <p:childTnLst>
+                        <p:par>
+                          <p:cTn id="12" fill="hold">
+                            <p:stCondLst>
+                              <p:cond delay="0"/>
+                            </p:stCondLst>
+                            <p:childTnLst>
+                              <p:par>
+                                <p:cTn id="13" presetID="1" presetClass="entr" presetSubtype="0" fill="hold" grpId="0" nodeType="clickEffect">
+                                  <p:stCondLst>
+                                    <p:cond delay="0"/>
+                                  </p:stCondLst>
+                                  <p:childTnLst>
+                                    <p:set>
+                                      <p:cBhvr>
+                                        <p:cTn id="14" dur="1" fill="hold">
+                                          <p:stCondLst>
+                                            <p:cond delay="0"/>
+                                          </p:stCondLst>
+                                        </p:cTn>
+                                        <p:tgtEl>
+                                          <p:spTgt spid="3">
+                                            <p:txEl>
+                                              <p:pRg st="4" end="4"/>
+                                            </p:txEl>
+                                          </p:spTgt>
+                                        </p:tgtEl>
+                                        <p:attrNameLst>
+                                          <p:attrName>style.visibility</p:attrName>
+                                        </p:attrNameLst>
+                                      </p:cBhvr>
+                                      <p:to>
+                                        <p:strVal val="visible"/>
+                                      </p:to>
+                                    </p:set>
+                                  </p:childTnLst>
+                                </p:cTn>
+                              </p:par>
+                            </p:childTnLst>
+                          </p:cTn>
+                        </p:par>
+                      </p:childTnLst>
+                    </p:cTn>
+                  </p:par>
+                  <p:par>
+                    <p:cTn id="15" fill="hold">
+                      <p:stCondLst>
+                        <p:cond delay="indefinite"/>
+                      </p:stCondLst>
+                      <p:childTnLst>
+                        <p:par>
+                          <p:cTn id="16" fill="hold">
+                            <p:stCondLst>
+                              <p:cond delay="0"/>
+                            </p:stCondLst>
+                            <p:childTnLst>
+                              <p:par>
+                                <p:cTn id="17" presetID="1" presetClass="entr" presetSubtype="0" fill="hold" grpId="0" nodeType="clickEffect">
+                                  <p:stCondLst>
+                                    <p:cond delay="0"/>
+                                  </p:stCondLst>
+                                  <p:childTnLst>
+                                    <p:set>
+                                      <p:cBhvr>
+                                        <p:cTn id="18" dur="1" fill="hold">
+                                          <p:stCondLst>
+                                            <p:cond delay="0"/>
+                                          </p:stCondLst>
+                                        </p:cTn>
+                                        <p:tgtEl>
+                                          <p:spTgt spid="3">
+                                            <p:txEl>
+                                              <p:pRg st="5" end="5"/>
+                                            </p:txEl>
+                                          </p:spTgt>
+                                        </p:tgtEl>
+                                        <p:attrNameLst>
+                                          <p:attrName>style.visibility</p:attrName>
+                                        </p:attrNameLst>
+                                      </p:cBhvr>
+                                      <p:to>
+                                        <p:strVal val="visible"/>
+                                      </p:to>
+                                    </p:set>
+                                  </p:childTnLst>
+                                </p:cTn>
+                              </p:par>
+                            </p:childTnLst>
+                          </p:cTn>
+                        </p:par>
+                      </p:childTnLst>
+                    </p:cTn>
+                  </p:par>
+                  <p:par>
+                    <p:cTn id="19" fill="hold">
+                      <p:stCondLst>
+                        <p:cond delay="indefinite"/>
+                      </p:stCondLst>
+                      <p:childTnLst>
+                        <p:par>
+                          <p:cTn id="20" fill="hold">
+                            <p:stCondLst>
+                              <p:cond delay="0"/>
+                            </p:stCondLst>
+                            <p:childTnLst>
+                              <p:par>
+                                <p:cTn id="21" presetID="1" presetClass="entr" presetSubtype="0" fill="hold" grpId="0" nodeType="clickEffect">
+                                  <p:stCondLst>
+                                    <p:cond delay="0"/>
+                                  </p:stCondLst>
+                                  <p:childTnLst>
+                                    <p:set>
+                                      <p:cBhvr>
+                                        <p:cTn id="22" dur="1" fill="hold">
+                                          <p:stCondLst>
+                                            <p:cond delay="0"/>
+                                          </p:stCondLst>
+                                        </p:cTn>
+                                        <p:tgtEl>
+                                          <p:spTgt spid="3">
+                                            <p:txEl>
+                                              <p:pRg st="6" end="6"/>
+                                            </p:txEl>
+                                          </p:spTgt>
+                                        </p:tgtEl>
+                                        <p:attrNameLst>
+                                          <p:attrName>style.visibility</p:attrName>
+                                        </p:attrNameLst>
+                                      </p:cBhvr>
+                                      <p:to>
+                                        <p:strVal val="visible"/>
+                                      </p:to>
+                                    </p:set>
+                                  </p:childTnLst>
+                                </p:cTn>
+                              </p:par>
+                            </p:childTnLst>
+                          </p:cTn>
+                        </p:par>
+                      </p:childTnLst>
+                    </p:cTn>
+                  </p:par>
+                  <p:par>
+                    <p:cTn id="23" fill="hold">
+                      <p:stCondLst>
+                        <p:cond delay="indefinite"/>
+                      </p:stCondLst>
+                      <p:childTnLst>
+                        <p:par>
+                          <p:cTn id="24" fill="hold">
+                            <p:stCondLst>
+                              <p:cond delay="0"/>
+                            </p:stCondLst>
+                            <p:childTnLst>
+                              <p:par>
+                                <p:cTn id="25" presetID="1" presetClass="entr" presetSubtype="0" fill="hold" grpId="0" nodeType="clickEffect">
+                                  <p:stCondLst>
+                                    <p:cond delay="0"/>
+                                  </p:stCondLst>
+                                  <p:childTnLst>
+                                    <p:set>
+                                      <p:cBhvr>
+                                        <p:cTn id="26" dur="1" fill="hold">
+                                          <p:stCondLst>
+                                            <p:cond delay="0"/>
+                                          </p:stCondLst>
+                                        </p:cTn>
+                                        <p:tgtEl>
+                                          <p:spTgt spid="3">
+                                            <p:txEl>
+                                              <p:pRg st="7" end="7"/>
+                                            </p:txEl>
+                                          </p:spTgt>
+                                        </p:tgtEl>
+                                        <p:attrNameLst>
+                                          <p:attrName>style.visibility</p:attrName>
+                                        </p:attrNameLst>
+                                      </p:cBhvr>
+                                      <p:to>
+                                        <p:strVal val="visible"/>
+                                      </p:to>
+                                    </p:set>
+                                  </p:childTnLst>
+                                </p:cTn>
+                              </p:par>
+                            </p:childTnLst>
+                          </p:cTn>
+                        </p:par>
+                      </p:childTnLst>
+                    </p:cTn>
+                  </p:par>
+                  <p:par>
+                    <p:cTn id="27" fill="hold">
+                      <p:stCondLst>
+                        <p:cond delay="indefinite"/>
+                      </p:stCondLst>
+                      <p:childTnLst>
+                        <p:par>
+                          <p:cTn id="28" fill="hold">
+                            <p:stCondLst>
+                              <p:cond delay="0"/>
+                            </p:stCondLst>
+                            <p:childTnLst>
+                              <p:par>
+                                <p:cTn id="29" presetID="1" presetClass="entr" presetSubtype="0" fill="hold" grpId="0" nodeType="clickEffect">
+                                  <p:stCondLst>
+                                    <p:cond delay="0"/>
+                                  </p:stCondLst>
+                                  <p:childTnLst>
+                                    <p:set>
+                                      <p:cBhvr>
+                                        <p:cTn id="30" dur="1" fill="hold">
+                                          <p:stCondLst>
+                                            <p:cond delay="0"/>
+                                          </p:stCondLst>
+                                        </p:cTn>
+                                        <p:tgtEl>
+                                          <p:spTgt spid="3">
+                                            <p:txEl>
+                                              <p:pRg st="8" end="8"/>
+                                            </p:txEl>
+                                          </p:spTgt>
+                                        </p:tgtEl>
+                                        <p:attrNameLst>
+                                          <p:attrName>style.visibility</p:attrName>
+                                        </p:attrNameLst>
+                                      </p:cBhvr>
+                                      <p:to>
+                                        <p:strVal val="visible"/>
+                                      </p:to>
+                                    </p:set>
+                                  </p:childTnLst>
+                                </p:cTn>
+                              </p:par>
+                            </p:childTnLst>
+                          </p:cTn>
+                        </p:par>
+                      </p:childTnLst>
+                    </p:cTn>
+                  </p:par>
+                </p:childTnLst>
+              </p:cTn>
+              <p:prevCondLst>
+                <p:cond evt="onPrev" delay="0">
+                  <p:tgtEl>
+                    <p:sldTgt/>
+                  </p:tgtEl>
+                </p:cond>
+              </p:prevCondLst>
+              <p:nextCondLst>
+                <p:cond evt="onNext" delay="0">
+                  <p:tgtEl>
+                    <p:sldTgt/>
+                  </p:tgtEl>
+                </p:cond>
+              </p:nextCondLst>
+            </p:seq>
+          </p:childTnLst>
+        </p:cTn>
+      </p:par>
+    </p:tnLst>
+    <p:bldLst>
+      <p:bldP spid="3" grpId="0" uiExpand="1" build="p"/>
+    </p:bldLst>
+  </p:timing>
+</p:sld>
+</file>
+
+<file path=ppt/slides/slide11.xml><?xml version="1.0" encoding="utf-8"?>
+<p:sld xmlns:a="http://schemas.openxmlformats.org/drawingml/2006/main" xmlns:r="http://schemas.openxmlformats.org/officeDocument/2006/relationships" xmlns:p="http://schemas.openxmlformats.org/presentationml/2006/main">
+  <p:cSld>
+    <p:spTree>
+      <p:nvGrpSpPr>
+        <p:cNvPr id="1" name=""/>
+        <p:cNvGrpSpPr/>
+        <p:nvPr/>
+      </p:nvGrpSpPr>
+      <p:grpSpPr>
+        <a:xfrm>
+          <a:off x="0" y="0"/>
+          <a:ext cx="0" cy="0"/>
+          <a:chOff x="0" y="0"/>
+          <a:chExt cx="0" cy="0"/>
+        </a:xfrm>
+      </p:grpSpPr>
+      <p:sp>
+        <p:nvSpPr>
+          <p:cNvPr id="3" name="Content Placeholder 2"/>
+          <p:cNvSpPr>
+            <a:spLocks noGrp="1"/>
+          </p:cNvSpPr>
+          <p:nvPr>
+            <p:ph idx="1"/>
+          </p:nvPr>
+        </p:nvSpPr>
+        <p:spPr/>
+        <p:txBody>
+          <a:bodyPr/>
+          <a:lstStyle/>
+          <a:p>
+            <a:pPr lvl="0" indent="0" marL="0">
+              <a:spcBef>
+                <a:spcPts val="3000"/>
+              </a:spcBef>
+              <a:buNone/>
+            </a:pPr>
+            <a:r>
+              <a:rPr b="1"/>
+              <a:t>레이어(Layers)</a:t>
+            </a:r>
+          </a:p>
+          <a:p>
+            <a:pPr lvl="0"/>
+            <a:r>
+              <a:rPr/>
+              <a:t>캔버스 상의 하나의 요소(Elements)</a:t>
+            </a:r>
+          </a:p>
+          <a:p>
+            <a:pPr lvl="0" indent="0" marL="0">
+              <a:spcBef>
+                <a:spcPts val="3000"/>
+              </a:spcBef>
+              <a:buNone/>
+            </a:pPr>
+            <a:r>
+              <a:rPr b="1"/>
+              <a:t>브레이크포인트(Breakpoint)</a:t>
+            </a:r>
+          </a:p>
+          <a:p>
+            <a:pPr lvl="0"/>
+            <a:r>
+              <a:rPr/>
+              <a:t>실제로 웹에 보여지게 되는 프레임</a:t>
+            </a:r>
+          </a:p>
+          <a:p>
+            <a:pPr lvl="0" indent="0" marL="0">
+              <a:spcBef>
+                <a:spcPts val="3000"/>
+              </a:spcBef>
+              <a:buNone/>
+            </a:pPr>
+            <a:r>
+              <a:rPr b="1"/>
+              <a:t>에셋(Assets)</a:t>
+            </a:r>
+          </a:p>
+          <a:p>
+            <a:pPr lvl="0"/>
+            <a:r>
+              <a:rPr/>
+              <a:t>반복해서 사용하게 되는 페이지의 구성 요소(Components)</a:t>
+            </a:r>
+          </a:p>
+        </p:txBody>
+      </p:sp>
+    </p:spTree>
+  </p:cSld>
+  <p:timing>
+    <p:tnLst>
+      <p:par>
+        <p:cTn id="1" dur="indefinite" restart="never" nodeType="tmRoot">
+          <p:childTnLst>
+            <p:seq concurrent="1" nextAc="seek">
+              <p:cTn id="2" dur="indefinite" nodeType="mainSeq">
+                <p:childTnLst>
+                  <p:par>
+                    <p:cTn id="3" fill="hold">
+                      <p:stCondLst>
+                        <p:cond delay="indefinite"/>
+                      </p:stCondLst>
+                      <p:childTnLst>
+                        <p:par>
+                          <p:cTn id="4" fill="hold">
+                            <p:stCondLst>
+                              <p:cond delay="0"/>
+                            </p:stCondLst>
+                            <p:childTnLst>
+                              <p:par>
+                                <p:cTn id="5" presetID="1" presetClass="entr" presetSubtype="0" fill="hold" grpId="0" nodeType="clickEffect">
+                                  <p:stCondLst>
+                                    <p:cond delay="0"/>
+                                  </p:stCondLst>
+                                  <p:childTnLst>
+                                    <p:set>
+                                      <p:cBhvr>
+                                        <p:cTn id="6" dur="1" fill="hold">
+                                          <p:stCondLst>
+                                            <p:cond delay="0"/>
+                                          </p:stCondLst>
+                                        </p:cTn>
+                                        <p:tgtEl>
+                                          <p:spTgt spid="3">
+                                            <p:txEl>
+                                              <p:pRg st="1" end="1"/>
+                                            </p:txEl>
+                                          </p:spTgt>
+                                        </p:tgtEl>
+                                        <p:attrNameLst>
+                                          <p:attrName>style.visibility</p:attrName>
+                                        </p:attrNameLst>
+                                      </p:cBhvr>
+                                      <p:to>
+                                        <p:strVal val="visible"/>
+                                      </p:to>
+                                    </p:set>
+                                  </p:childTnLst>
+                                </p:cTn>
+                              </p:par>
+                            </p:childTnLst>
+                          </p:cTn>
+                        </p:par>
+                      </p:childTnLst>
+                    </p:cTn>
+                  </p:par>
+                  <p:par>
+                    <p:cTn id="7" fill="hold">
+                      <p:stCondLst>
+                        <p:cond delay="indefinite"/>
+                      </p:stCondLst>
+                      <p:childTnLst>
+                        <p:par>
+                          <p:cTn id="8" fill="hold">
+                            <p:stCondLst>
+                              <p:cond delay="0"/>
+                            </p:stCondLst>
+                            <p:childTnLst>
+                              <p:par>
+                                <p:cTn id="9" presetID="1" presetClass="entr" presetSubtype="0" fill="hold" grpId="0" nodeType="clickEffect">
+                                  <p:stCondLst>
+                                    <p:cond delay="0"/>
+                                  </p:stCondLst>
+                                  <p:childTnLst>
+                                    <p:set>
+                                      <p:cBhvr>
+                                        <p:cTn id="10" dur="1" fill="hold">
+                                          <p:stCondLst>
+                                            <p:cond delay="0"/>
+                                          </p:stCondLst>
+                                        </p:cTn>
+                                        <p:tgtEl>
+                                          <p:spTgt spid="3">
+                                            <p:txEl>
+                                              <p:pRg st="3" end="3"/>
+                                            </p:txEl>
+                                          </p:spTgt>
+                                        </p:tgtEl>
+                                        <p:attrNameLst>
+                                          <p:attrName>style.visibility</p:attrName>
+                                        </p:attrNameLst>
+                                      </p:cBhvr>
+                                      <p:to>
+                                        <p:strVal val="visible"/>
+                                      </p:to>
+                                    </p:set>
+                                  </p:childTnLst>
+                                </p:cTn>
+                              </p:par>
+                            </p:childTnLst>
+                          </p:cTn>
+                        </p:par>
+                      </p:childTnLst>
+                    </p:cTn>
+                  </p:par>
+                  <p:par>
+                    <p:cTn id="11" fill="hold">
+                      <p:stCondLst>
+                        <p:cond delay="indefinite"/>
+                      </p:stCondLst>
+                      <p:childTnLst>
+                        <p:par>
+                          <p:cTn id="12" fill="hold">
+                            <p:stCondLst>
+                              <p:cond delay="0"/>
+                            </p:stCondLst>
+                            <p:childTnLst>
+                              <p:par>
+                                <p:cTn id="13" presetID="1" presetClass="entr" presetSubtype="0" fill="hold" grpId="0" nodeType="clickEffect">
+                                  <p:stCondLst>
+                                    <p:cond delay="0"/>
+                                  </p:stCondLst>
+                                  <p:childTnLst>
+                                    <p:set>
+                                      <p:cBhvr>
+                                        <p:cTn id="14" dur="1" fill="hold">
+                                          <p:stCondLst>
+                                            <p:cond delay="0"/>
+                                          </p:stCondLst>
+                                        </p:cTn>
+                                        <p:tgtEl>
+                                          <p:spTgt spid="3">
+                                            <p:txEl>
+                                              <p:pRg st="5" end="5"/>
+                                            </p:txEl>
+                                          </p:spTgt>
+                                        </p:tgtEl>
+                                        <p:attrNameLst>
+                                          <p:attrName>style.visibility</p:attrName>
+                                        </p:attrNameLst>
+                                      </p:cBhvr>
+                                      <p:to>
+                                        <p:strVal val="visible"/>
+                                      </p:to>
+                                    </p:set>
+                                  </p:childTnLst>
+                                </p:cTn>
+                              </p:par>
+                            </p:childTnLst>
+                          </p:cTn>
+                        </p:par>
+                      </p:childTnLst>
+                    </p:cTn>
+                  </p:par>
+                </p:childTnLst>
+              </p:cTn>
+              <p:prevCondLst>
+                <p:cond evt="onPrev" delay="0">
+                  <p:tgtEl>
+                    <p:sldTgt/>
+                  </p:tgtEl>
+                </p:cond>
+              </p:prevCondLst>
+              <p:nextCondLst>
+                <p:cond evt="onNext" delay="0">
+                  <p:tgtEl>
+                    <p:sldTgt/>
+                  </p:tgtEl>
+                </p:cond>
+              </p:nextCondLst>
+            </p:seq>
+          </p:childTnLst>
+        </p:cTn>
+      </p:par>
+    </p:tnLst>
+    <p:bldLst>
+      <p:bldP spid="3" grpId="0" uiExpand="1" build="p"/>
+    </p:bldLst>
+  </p:timing>
+</p:sld>
+</file>
+
 <file path=ppt/slides/slide2.xml><?xml version="1.0" encoding="utf-8"?>
 <p:sld xmlns:a="http://schemas.openxmlformats.org/drawingml/2006/main" xmlns:r="http://schemas.openxmlformats.org/officeDocument/2006/relationships" xmlns:p="http://schemas.openxmlformats.org/presentationml/2006/main">
   <p:cSld>
@@ -4546,6 +5336,15 @@
             <a:r>
               <a:rPr/>
               <a:t>토스는 Deux 라는 이름의 별도 도구를 만들고 있다는 소문</a:t>
+            </a:r>
+          </a:p>
+          <a:p>
+            <a:pPr lvl="1"/>
+            <a:r>
+              <a:rPr>
+                <a:hlinkClick r:id="rId2"/>
+              </a:rPr>
+              <a:t>지금, 툴이 아닌 틀을 바꿔야할 때</a:t>
             </a:r>
           </a:p>
         </p:txBody>
@@ -5030,6 +5829,55 @@
                                           <p:spTgt spid="3">
                                             <p:txEl>
                                               <p:pRg st="9" end="9"/>
+                                            </p:txEl>
+                                          </p:spTgt>
+                                        </p:tgtEl>
+                                        <p:attrNameLst>
+                                          <p:attrName>style.visibility</p:attrName>
+                                        </p:attrNameLst>
+                                      </p:cBhvr>
+                                      <p:to>
+                                        <p:strVal val="visible"/>
+                                      </p:to>
+                                    </p:set>
+                                  </p:childTnLst>
+                                </p:cTn>
+                              </p:par>
+                            </p:childTnLst>
+                          </p:cTn>
+                        </p:par>
+                      </p:childTnLst>
+                    </p:cTn>
+                  </p:par>
+                  <p:par>
+                    <p:cTn id="43" fill="hold">
+                      <p:stCondLst>
+                        <p:cond delay="indefinite"/>
+                      </p:stCondLst>
+                      <p:childTnLst>
+                        <p:par>
+                          <p:cTn id="44" fill="hold">
+                            <p:stCondLst>
+                              <p:cond delay="0"/>
+                            </p:stCondLst>
+                            <p:childTnLst>
+                              <p:par>
+                                <p:cTn id="45" presetID="1" presetClass="entr" presetSubtype="0" fill="hold" grpId="0" nodeType="clickEffect">
+                                  <p:stCondLst>
+                                    <p:cond delay="0"/>
+                                  </p:stCondLst>
+                                  <p:childTnLst>
+                                    <p:set>
+                                      <p:cBhvr>
+                                        <p:cTn id="46" dur="1" fill="hold">
+                                          <p:stCondLst>
+                                            <p:cond delay="0"/>
+                                          </p:stCondLst>
+                                        </p:cTn>
+                                        <p:tgtEl>
+                                          <p:spTgt spid="3">
+                                            <p:txEl>
+                                              <p:pRg st="10" end="10"/>
                                             </p:txEl>
                                           </p:spTgt>
                                         </p:tgtEl>
@@ -7966,6 +8814,270 @@
 </p:sld>
 </file>
 
+<file path=ppt/slides/slide9.xml><?xml version="1.0" encoding="utf-8"?>
+<p:sld xmlns:a="http://schemas.openxmlformats.org/drawingml/2006/main" xmlns:r="http://schemas.openxmlformats.org/officeDocument/2006/relationships" xmlns:p="http://schemas.openxmlformats.org/presentationml/2006/main">
+  <p:cSld>
+    <p:spTree>
+      <p:nvGrpSpPr>
+        <p:cNvPr id="1" name=""/>
+        <p:cNvGrpSpPr/>
+        <p:nvPr/>
+      </p:nvGrpSpPr>
+      <p:grpSpPr>
+        <a:xfrm>
+          <a:off x="0" y="0"/>
+          <a:ext cx="0" cy="0"/>
+          <a:chOff x="0" y="0"/>
+          <a:chExt cx="0" cy="0"/>
+        </a:xfrm>
+      </p:grpSpPr>
+      <p:sp>
+        <p:nvSpPr>
+          <p:cNvPr id="2" name="Title 1"/>
+          <p:cNvSpPr>
+            <a:spLocks noGrp="1"/>
+          </p:cNvSpPr>
+          <p:nvPr>
+            <p:ph type="title"/>
+          </p:nvPr>
+        </p:nvSpPr>
+        <p:spPr/>
+        <p:txBody>
+          <a:bodyPr/>
+          <a:lstStyle/>
+          <a:p>
+            <a:pPr lvl="0" indent="0" marL="0">
+              <a:buNone/>
+            </a:pPr>
+            <a:r>
+              <a:rPr/>
+              <a:t>팀</a:t>
+            </a:r>
+          </a:p>
+        </p:txBody>
+      </p:sp>
+      <p:sp>
+        <p:nvSpPr>
+          <p:cNvPr id="3" name="Content Placeholder 2"/>
+          <p:cNvSpPr>
+            <a:spLocks noGrp="1"/>
+          </p:cNvSpPr>
+          <p:nvPr>
+            <p:ph idx="1"/>
+          </p:nvPr>
+        </p:nvSpPr>
+        <p:spPr/>
+        <p:txBody>
+          <a:bodyPr/>
+          <a:lstStyle/>
+          <a:p>
+            <a:pPr lvl="0"/>
+            <a:r>
+              <a:rPr/>
+              <a:t>모든 프레이머 문서(프로젝트)는 팀에 귀속됨.</a:t>
+            </a:r>
+          </a:p>
+          <a:p>
+            <a:pPr lvl="0"/>
+            <a:r>
+              <a:rPr/>
+              <a:t>다른 사람들과의 협업을 위해서는 결제가 필수</a:t>
+            </a:r>
+          </a:p>
+          <a:p>
+            <a:pPr lvl="0"/>
+            <a:r>
+              <a:rPr/>
+              <a:t>특이하게도 프레이머 문서는 삭제가 불가능</a:t>
+            </a:r>
+          </a:p>
+        </p:txBody>
+      </p:sp>
+    </p:spTree>
+  </p:cSld>
+  <p:timing>
+    <p:tnLst>
+      <p:par>
+        <p:cTn id="1" dur="indefinite" restart="never" nodeType="tmRoot">
+          <p:childTnLst>
+            <p:seq concurrent="1" nextAc="seek">
+              <p:cTn id="2" dur="indefinite" nodeType="mainSeq">
+                <p:childTnLst>
+                  <p:par>
+                    <p:cTn id="3" fill="hold">
+                      <p:stCondLst>
+                        <p:cond delay="indefinite"/>
+                      </p:stCondLst>
+                      <p:childTnLst>
+                        <p:par>
+                          <p:cTn id="4" fill="hold">
+                            <p:stCondLst>
+                              <p:cond delay="0"/>
+                            </p:stCondLst>
+                            <p:childTnLst>
+                              <p:par>
+                                <p:cTn id="5" presetID="1" presetClass="entr" presetSubtype="0" fill="hold" grpId="0" nodeType="clickEffect">
+                                  <p:stCondLst>
+                                    <p:cond delay="0"/>
+                                  </p:stCondLst>
+                                  <p:childTnLst>
+                                    <p:set>
+                                      <p:cBhvr>
+                                        <p:cTn id="6" dur="1" fill="hold">
+                                          <p:stCondLst>
+                                            <p:cond delay="0"/>
+                                          </p:stCondLst>
+                                        </p:cTn>
+                                        <p:tgtEl>
+                                          <p:spTgt spid="3">
+                                            <p:txEl>
+                                              <p:pRg st="0" end="0"/>
+                                            </p:txEl>
+                                          </p:spTgt>
+                                        </p:tgtEl>
+                                        <p:attrNameLst>
+                                          <p:attrName>style.visibility</p:attrName>
+                                        </p:attrNameLst>
+                                      </p:cBhvr>
+                                      <p:to>
+                                        <p:strVal val="visible"/>
+                                      </p:to>
+                                    </p:set>
+                                  </p:childTnLst>
+                                </p:cTn>
+                              </p:par>
+                            </p:childTnLst>
+                          </p:cTn>
+                        </p:par>
+                      </p:childTnLst>
+                    </p:cTn>
+                  </p:par>
+                  <p:par>
+                    <p:cTn id="7" fill="hold">
+                      <p:stCondLst>
+                        <p:cond delay="indefinite"/>
+                      </p:stCondLst>
+                      <p:childTnLst>
+                        <p:par>
+                          <p:cTn id="8" fill="hold">
+                            <p:stCondLst>
+                              <p:cond delay="0"/>
+                            </p:stCondLst>
+                            <p:childTnLst>
+                              <p:par>
+                                <p:cTn id="9" presetID="1" presetClass="entr" presetSubtype="0" fill="hold" grpId="0" nodeType="clickEffect">
+                                  <p:stCondLst>
+                                    <p:cond delay="0"/>
+                                  </p:stCondLst>
+                                  <p:childTnLst>
+                                    <p:set>
+                                      <p:cBhvr>
+                                        <p:cTn id="10" dur="1" fill="hold">
+                                          <p:stCondLst>
+                                            <p:cond delay="0"/>
+                                          </p:stCondLst>
+                                        </p:cTn>
+                                        <p:tgtEl>
+                                          <p:spTgt spid="3">
+                                            <p:txEl>
+                                              <p:pRg st="1" end="1"/>
+                                            </p:txEl>
+                                          </p:spTgt>
+                                        </p:tgtEl>
+                                        <p:attrNameLst>
+                                          <p:attrName>style.visibility</p:attrName>
+                                        </p:attrNameLst>
+                                      </p:cBhvr>
+                                      <p:to>
+                                        <p:strVal val="visible"/>
+                                      </p:to>
+                                    </p:set>
+                                  </p:childTnLst>
+                                </p:cTn>
+                              </p:par>
+                            </p:childTnLst>
+                          </p:cTn>
+                        </p:par>
+                      </p:childTnLst>
+                    </p:cTn>
+                  </p:par>
+                  <p:par>
+                    <p:cTn id="11" fill="hold">
+                      <p:stCondLst>
+                        <p:cond delay="indefinite"/>
+                      </p:stCondLst>
+                      <p:childTnLst>
+                        <p:par>
+                          <p:cTn id="12" fill="hold">
+                            <p:stCondLst>
+                              <p:cond delay="0"/>
+                            </p:stCondLst>
+                            <p:childTnLst>
+                              <p:par>
+                                <p:cTn id="13" presetID="1" presetClass="entr" presetSubtype="0" fill="hold" grpId="0" nodeType="clickEffect">
+                                  <p:stCondLst>
+                                    <p:cond delay="0"/>
+                                  </p:stCondLst>
+                                  <p:childTnLst>
+                                    <p:set>
+                                      <p:cBhvr>
+                                        <p:cTn id="14" dur="1" fill="hold">
+                                          <p:stCondLst>
+                                            <p:cond delay="0"/>
+                                          </p:stCondLst>
+                                        </p:cTn>
+                                        <p:tgtEl>
+                                          <p:spTgt spid="3">
+                                            <p:txEl>
+                                              <p:pRg st="2" end="2"/>
+                                            </p:txEl>
+                                          </p:spTgt>
+                                        </p:tgtEl>
+                                        <p:attrNameLst>
+                                          <p:attrName>style.visibility</p:attrName>
+                                        </p:attrNameLst>
+                                      </p:cBhvr>
+                                      <p:to>
+                                        <p:strVal val="visible"/>
+                                      </p:to>
+                                    </p:set>
+                                  </p:childTnLst>
+                                </p:cTn>
+                              </p:par>
+                            </p:childTnLst>
+                          </p:cTn>
+                        </p:par>
+                      </p:childTnLst>
+                    </p:cTn>
+                  </p:par>
+                </p:childTnLst>
+              </p:cTn>
+              <p:prevCondLst>
+                <p:cond evt="onPrev" delay="0">
+                  <p:tgtEl>
+                    <p:sldTgt/>
+                  </p:tgtEl>
+                </p:cond>
+              </p:prevCondLst>
+              <p:nextCondLst>
+                <p:cond evt="onNext" delay="0">
+                  <p:tgtEl>
+                    <p:sldTgt/>
+                  </p:tgtEl>
+                </p:cond>
+              </p:nextCondLst>
+            </p:seq>
+          </p:childTnLst>
+        </p:cTn>
+      </p:par>
+    </p:tnLst>
+    <p:bldLst>
+      <p:bldP spid="3" grpId="0" uiExpand="1" build="p"/>
+    </p:bldLst>
+  </p:timing>
+</p:sld>
+</file>
+
 <file path=ppt/theme/theme1.xml><?xml version="1.0" encoding="utf-8"?>
 <a:theme xmlns:a="http://schemas.openxmlformats.org/drawingml/2006/main" name="Gallery">
   <a:themeElements>

</xml_diff>

<commit_message>
백업 완료: 2023-11-26 04:45:41
Affected files:
.obsidian/workspace.json
노코드 엔지니어링/노코드 최강자 버블.md
노코드 엔지니어링/노코드 최강자 버블.pptx
노코드 엔지니어링/프레이머로 블로그 만들기.pptx
</commit_message>
<xml_diff>
--- a/노코드 엔지니어링/프레이머로 블로그 만들기.pptx
+++ b/노코드 엔지니어링/프레이머로 블로그 만들기.pptx
@@ -4917,13 +4917,6 @@
               <a:t>자식을 배치하는 경우, 자식이 차지하는 부모 컨테이너 영역에서의 비율.</a:t>
             </a:r>
           </a:p>
-          <a:p>
-            <a:pPr lvl="1"/>
-            <a:r>
-              <a:rPr/>
-              <a:t>이 비율에 따라 자식이 부모의 영역을 나눠갖게 됨</a:t>
-            </a:r>
-          </a:p>
         </p:txBody>
       </p:sp>
     </p:spTree>
@@ -5308,55 +5301,6 @@
                                           <p:spTgt spid="3">
                                             <p:txEl>
                                               <p:pRg st="7" end="7"/>
-                                            </p:txEl>
-                                          </p:spTgt>
-                                        </p:tgtEl>
-                                        <p:attrNameLst>
-                                          <p:attrName>style.visibility</p:attrName>
-                                        </p:attrNameLst>
-                                      </p:cBhvr>
-                                      <p:to>
-                                        <p:strVal val="visible"/>
-                                      </p:to>
-                                    </p:set>
-                                  </p:childTnLst>
-                                </p:cTn>
-                              </p:par>
-                            </p:childTnLst>
-                          </p:cTn>
-                        </p:par>
-                      </p:childTnLst>
-                    </p:cTn>
-                  </p:par>
-                  <p:par>
-                    <p:cTn id="35" fill="hold">
-                      <p:stCondLst>
-                        <p:cond delay="indefinite"/>
-                      </p:stCondLst>
-                      <p:childTnLst>
-                        <p:par>
-                          <p:cTn id="36" fill="hold">
-                            <p:stCondLst>
-                              <p:cond delay="0"/>
-                            </p:stCondLst>
-                            <p:childTnLst>
-                              <p:par>
-                                <p:cTn id="37" presetID="1" presetClass="entr" presetSubtype="0" fill="hold" grpId="0" nodeType="clickEffect">
-                                  <p:stCondLst>
-                                    <p:cond delay="0"/>
-                                  </p:stCondLst>
-                                  <p:childTnLst>
-                                    <p:set>
-                                      <p:cBhvr>
-                                        <p:cTn id="38" dur="1" fill="hold">
-                                          <p:stCondLst>
-                                            <p:cond delay="0"/>
-                                          </p:stCondLst>
-                                        </p:cTn>
-                                        <p:tgtEl>
-                                          <p:spTgt spid="3">
-                                            <p:txEl>
-                                              <p:pRg st="8" end="8"/>
                                             </p:txEl>
                                           </p:spTgt>
                                         </p:tgtEl>
@@ -6003,7 +5947,7 @@
             <a:pPr lvl="0"/>
             <a:r>
               <a:rPr/>
-              <a:t>vw는 사용할 수 없으나, 텍스트를 부모 컨테이너에 Relative한 크기로 만들 수 있음.</a:t>
+              <a:t>vw(Viewport Width)는 사용할 수 없으나, 텍스트를 부모 컨테이너에 Relative한 크기로 만들 수 있음.</a:t>
             </a:r>
           </a:p>
           <a:p>

</xml_diff>